<commit_message>
Found the pyrouge-error. Planned and tested a workaround, still to be developed.
</commit_message>
<xml_diff>
--- a/Thesis/Präsentation Vorarbeiten Vogel.pptx
+++ b/Thesis/Präsentation Vorarbeiten Vogel.pptx
@@ -247,7 +247,7 @@
           <a:p>
             <a:fld id="{FFEEB748-6EF0-4F8F-9F33-BFE4B75DB5ED}" type="datetimeFigureOut">
               <a:rPr lang="de-DE" smtClean="0"/>
-              <a:t>09.01.2021</a:t>
+              <a:t>12.01.2021</a:t>
             </a:fld>
             <a:endParaRPr lang="de-DE"/>
           </a:p>
@@ -3515,6 +3515,36 @@
           </a:p>
         </p:txBody>
       </p:sp>
+      <p:pic>
+        <p:nvPicPr>
+          <p:cNvPr id="3" name="Grafik 2">
+            <a:extLst>
+              <a:ext uri="{FF2B5EF4-FFF2-40B4-BE49-F238E27FC236}">
+                <a16:creationId xmlns:a16="http://schemas.microsoft.com/office/drawing/2014/main" id="{9F78590D-64ED-470F-AED5-EE34EDFDB7F7}"/>
+              </a:ext>
+            </a:extLst>
+          </p:cNvPr>
+          <p:cNvPicPr>
+            <a:picLocks noChangeAspect="1"/>
+          </p:cNvPicPr>
+          <p:nvPr/>
+        </p:nvPicPr>
+        <p:blipFill>
+          <a:blip r:embed="rId2"/>
+          <a:stretch>
+            <a:fillRect/>
+          </a:stretch>
+        </p:blipFill>
+        <p:spPr>
+          <a:xfrm>
+            <a:off x="7680176" y="4618906"/>
+            <a:ext cx="4318765" cy="1303379"/>
+          </a:xfrm>
+          <a:prstGeom prst="rect">
+            <a:avLst/>
+          </a:prstGeom>
+        </p:spPr>
+      </p:pic>
     </p:spTree>
     <p:extLst>
       <p:ext uri="{BB962C8B-B14F-4D97-AF65-F5344CB8AC3E}">
@@ -6153,7 +6183,7 @@
             </a:r>
             <a:r>
               <a:rPr lang="de-DE" sz="2400" dirty="0"/>
-              <a:t> BERT-Encoder-Transformer-Decoder:</a:t>
+              <a:t> BERT-Encoder and Transformer-Decoder:</a:t>
             </a:r>
           </a:p>
           <a:p>
@@ -8543,6 +8573,14 @@
 </file>
 
 <file path=customXml/item2.xml><?xml version="1.0" encoding="utf-8"?>
+<p:properties xmlns:p="http://schemas.microsoft.com/office/2006/metadata/properties" xmlns:xsi="http://www.w3.org/2001/XMLSchema-instance" xmlns:pc="http://schemas.microsoft.com/office/infopath/2007/PartnerControls">
+  <documentManagement>
+    <IconOverlay xmlns="http://schemas.microsoft.com/sharepoint/v4" xsi:nil="true"/>
+  </documentManagement>
+</p:properties>
+</file>
+
+<file path=customXml/item3.xml><?xml version="1.0" encoding="utf-8"?>
 <ct:contentTypeSchema xmlns:ct="http://schemas.microsoft.com/office/2006/metadata/contentType" xmlns:ma="http://schemas.microsoft.com/office/2006/metadata/properties/metaAttributes" ct:_="" ma:_="" ma:contentTypeName="Dokument" ma:contentTypeID="0x01010053B62DFA35865A42BA8C48072822D320" ma:contentTypeVersion="1" ma:contentTypeDescription="Ein neues Dokument erstellen." ma:contentTypeScope="" ma:versionID="a55332ee8e2f401b1b39dade752ad91c">
   <xsd:schema xmlns:xsd="http://www.w3.org/2001/XMLSchema" xmlns:xs="http://www.w3.org/2001/XMLSchema" xmlns:p="http://schemas.microsoft.com/office/2006/metadata/properties" xmlns:ns2="http://schemas.microsoft.com/sharepoint/v4" targetNamespace="http://schemas.microsoft.com/office/2006/metadata/properties" ma:root="true" ma:fieldsID="50b3d1103363ee374add77635db28a27" ns2:_="">
     <xsd:import namespace="http://schemas.microsoft.com/sharepoint/v4"/>
@@ -8668,14 +8706,6 @@
 </ct:contentTypeSchema>
 </file>
 
-<file path=customXml/item3.xml><?xml version="1.0" encoding="utf-8"?>
-<p:properties xmlns:p="http://schemas.microsoft.com/office/2006/metadata/properties" xmlns:xsi="http://www.w3.org/2001/XMLSchema-instance" xmlns:pc="http://schemas.microsoft.com/office/infopath/2007/PartnerControls">
-  <documentManagement>
-    <IconOverlay xmlns="http://schemas.microsoft.com/sharepoint/v4" xsi:nil="true"/>
-  </documentManagement>
-</p:properties>
-</file>
-
 <file path=customXml/itemProps1.xml><?xml version="1.0" encoding="utf-8"?>
 <ds:datastoreItem xmlns:ds="http://schemas.openxmlformats.org/officeDocument/2006/customXml" ds:itemID="{91E797C5-FE70-414B-9D6D-28944D6E2B2F}">
   <ds:schemaRefs>
@@ -8685,6 +8715,22 @@
 </file>
 
 <file path=customXml/itemProps2.xml><?xml version="1.0" encoding="utf-8"?>
+<ds:datastoreItem xmlns:ds="http://schemas.openxmlformats.org/officeDocument/2006/customXml" ds:itemID="{F480BD12-1147-4D1A-A184-85A7FBA1723E}">
+  <ds:schemaRefs>
+    <ds:schemaRef ds:uri="http://schemas.microsoft.com/office/infopath/2007/PartnerControls"/>
+    <ds:schemaRef ds:uri="http://purl.org/dc/dcmitype/"/>
+    <ds:schemaRef ds:uri="http://schemas.microsoft.com/office/2006/documentManagement/types"/>
+    <ds:schemaRef ds:uri="http://schemas.microsoft.com/office/2006/metadata/properties"/>
+    <ds:schemaRef ds:uri="http://purl.org/dc/elements/1.1/"/>
+    <ds:schemaRef ds:uri="http://purl.org/dc/terms/"/>
+    <ds:schemaRef ds:uri="http://schemas.openxmlformats.org/package/2006/metadata/core-properties"/>
+    <ds:schemaRef ds:uri="http://schemas.microsoft.com/sharepoint/v4"/>
+    <ds:schemaRef ds:uri="http://www.w3.org/XML/1998/namespace"/>
+  </ds:schemaRefs>
+</ds:datastoreItem>
+</file>
+
+<file path=customXml/itemProps3.xml><?xml version="1.0" encoding="utf-8"?>
 <ds:datastoreItem xmlns:ds="http://schemas.openxmlformats.org/officeDocument/2006/customXml" ds:itemID="{DA71FCF8-826A-4F4E-A06C-05D1D6F1A543}">
   <ds:schemaRefs>
     <ds:schemaRef ds:uri="http://schemas.microsoft.com/office/2006/metadata/contentType"/>
@@ -8700,20 +8746,4 @@
     <ds:schemaRef ds:uri="http://schemas.microsoft.com/internal/obd"/>
   </ds:schemaRefs>
 </ds:datastoreItem>
-</file>
-
-<file path=customXml/itemProps3.xml><?xml version="1.0" encoding="utf-8"?>
-<ds:datastoreItem xmlns:ds="http://schemas.openxmlformats.org/officeDocument/2006/customXml" ds:itemID="{F480BD12-1147-4D1A-A184-85A7FBA1723E}">
-  <ds:schemaRefs>
-    <ds:schemaRef ds:uri="http://schemas.microsoft.com/office/infopath/2007/PartnerControls"/>
-    <ds:schemaRef ds:uri="http://purl.org/dc/dcmitype/"/>
-    <ds:schemaRef ds:uri="http://schemas.microsoft.com/office/2006/documentManagement/types"/>
-    <ds:schemaRef ds:uri="http://schemas.microsoft.com/office/2006/metadata/properties"/>
-    <ds:schemaRef ds:uri="http://purl.org/dc/elements/1.1/"/>
-    <ds:schemaRef ds:uri="http://purl.org/dc/terms/"/>
-    <ds:schemaRef ds:uri="http://schemas.openxmlformats.org/package/2006/metadata/core-properties"/>
-    <ds:schemaRef ds:uri="http://schemas.microsoft.com/sharepoint/v4"/>
-    <ds:schemaRef ds:uri="http://www.w3.org/XML/1998/namespace"/>
-  </ds:schemaRefs>
-</ds:datastoreItem>
 </file>
</xml_diff>

<commit_message>
Updated the thesis structure-wise.
</commit_message>
<xml_diff>
--- a/Thesis/Präsentation Vorarbeiten Vogel.pptx
+++ b/Thesis/Präsentation Vorarbeiten Vogel.pptx
@@ -3665,249 +3665,6 @@
           </a:p>
         </p:txBody>
       </p:sp>
-      <p:sp>
-        <p:nvSpPr>
-          <p:cNvPr id="6" name="Untertitel 2">
-            <a:extLst>
-              <a:ext uri="{FF2B5EF4-FFF2-40B4-BE49-F238E27FC236}">
-                <a16:creationId xmlns:a16="http://schemas.microsoft.com/office/drawing/2014/main" id="{52C97B79-DCFB-4B72-A8C3-38B23ED7CB1A}"/>
-              </a:ext>
-            </a:extLst>
-          </p:cNvPr>
-          <p:cNvSpPr txBox="1">
-            <a:spLocks/>
-          </p:cNvSpPr>
-          <p:nvPr/>
-        </p:nvSpPr>
-        <p:spPr bwMode="auto">
-          <a:xfrm>
-            <a:off x="7712010" y="5599348"/>
-            <a:ext cx="4046523" cy="267748"/>
-          </a:xfrm>
-          <a:prstGeom prst="rect">
-            <a:avLst/>
-          </a:prstGeom>
-          <a:noFill/>
-          <a:ln>
-            <a:noFill/>
-          </a:ln>
-          <a:extLst>
-            <a:ext uri="{909E8E84-426E-40DD-AFC4-6F175D3DCCD1}">
-              <a14:hiddenFill xmlns:a14="http://schemas.microsoft.com/office/drawing/2010/main">
-                <a:solidFill>
-                  <a:schemeClr val="accent1"/>
-                </a:solidFill>
-              </a14:hiddenFill>
-            </a:ext>
-            <a:ext uri="{91240B29-F687-4F45-9708-019B960494DF}">
-              <a14:hiddenLine xmlns:a14="http://schemas.microsoft.com/office/drawing/2010/main" w="9525">
-                <a:solidFill>
-                  <a:schemeClr val="tx1"/>
-                </a:solidFill>
-                <a:miter lim="800000"/>
-                <a:headEnd/>
-                <a:tailEnd/>
-              </a14:hiddenLine>
-            </a:ext>
-          </a:extLst>
-        </p:spPr>
-        <p:txBody>
-          <a:bodyPr vert="horz" wrap="square" lIns="91440" tIns="45720" rIns="91440" bIns="45720" numCol="1" anchor="t" anchorCtr="0" compatLnSpc="1">
-            <a:prstTxWarp prst="textNoShape">
-              <a:avLst/>
-            </a:prstTxWarp>
-          </a:bodyPr>
-          <a:lstStyle>
-            <a:lvl1pPr marL="342900" indent="-342900" algn="l" rtl="0" fontAlgn="base">
-              <a:spcBef>
-                <a:spcPts val="480"/>
-              </a:spcBef>
-              <a:spcAft>
-                <a:spcPts val="600"/>
-              </a:spcAft>
-              <a:buClr>
-                <a:srgbClr val="D20032"/>
-              </a:buClr>
-              <a:buSzPct val="100000"/>
-              <a:buFont typeface="Wingdings 3" panose="05040102010807070707" pitchFamily="18" charset="2"/>
-              <a:buChar char=""/>
-              <a:defRPr sz="2000">
-                <a:solidFill>
-                  <a:schemeClr val="tx1"/>
-                </a:solidFill>
-                <a:latin typeface="+mn-lt"/>
-                <a:ea typeface="+mn-ea"/>
-                <a:cs typeface="+mn-cs"/>
-              </a:defRPr>
-            </a:lvl1pPr>
-            <a:lvl2pPr marL="720000" indent="-288000" algn="l" rtl="0" fontAlgn="base">
-              <a:spcBef>
-                <a:spcPct val="20000"/>
-              </a:spcBef>
-              <a:spcAft>
-                <a:spcPts val="600"/>
-              </a:spcAft>
-              <a:buClr>
-                <a:srgbClr val="787878"/>
-              </a:buClr>
-              <a:buFont typeface="Symbol" panose="05050102010706020507" pitchFamily="18" charset="2"/>
-              <a:buChar char="-"/>
-              <a:defRPr sz="2000">
-                <a:solidFill>
-                  <a:schemeClr val="tx1"/>
-                </a:solidFill>
-                <a:latin typeface="+mn-lt"/>
-                <a:ea typeface="+mn-ea"/>
-              </a:defRPr>
-            </a:lvl2pPr>
-            <a:lvl3pPr marL="1080000" indent="-288000" algn="l" rtl="0" fontAlgn="base">
-              <a:spcBef>
-                <a:spcPct val="20000"/>
-              </a:spcBef>
-              <a:spcAft>
-                <a:spcPts val="600"/>
-              </a:spcAft>
-              <a:buClr>
-                <a:srgbClr val="646464"/>
-              </a:buClr>
-              <a:buFont typeface="Symbol" panose="05050102010706020507" pitchFamily="18" charset="2"/>
-              <a:buChar char="-"/>
-              <a:defRPr sz="2000">
-                <a:solidFill>
-                  <a:schemeClr val="tx1"/>
-                </a:solidFill>
-                <a:latin typeface="+mn-lt"/>
-                <a:ea typeface="+mn-ea"/>
-              </a:defRPr>
-            </a:lvl3pPr>
-            <a:lvl4pPr marL="1080000" indent="-288000" algn="l" rtl="0" fontAlgn="base">
-              <a:spcBef>
-                <a:spcPct val="20000"/>
-              </a:spcBef>
-              <a:spcAft>
-                <a:spcPts val="600"/>
-              </a:spcAft>
-              <a:buClr>
-                <a:srgbClr val="646464"/>
-              </a:buClr>
-              <a:buFont typeface="Symbol" panose="05050102010706020507" pitchFamily="18" charset="2"/>
-              <a:buChar char="-"/>
-              <a:defRPr sz="2000">
-                <a:solidFill>
-                  <a:schemeClr val="tx1"/>
-                </a:solidFill>
-                <a:latin typeface="+mn-lt"/>
-                <a:ea typeface="+mn-ea"/>
-              </a:defRPr>
-            </a:lvl4pPr>
-            <a:lvl5pPr marL="1080000" indent="-288000" algn="l" rtl="0" fontAlgn="base">
-              <a:spcBef>
-                <a:spcPct val="20000"/>
-              </a:spcBef>
-              <a:spcAft>
-                <a:spcPts val="600"/>
-              </a:spcAft>
-              <a:buClr>
-                <a:srgbClr val="646464"/>
-              </a:buClr>
-              <a:buFont typeface="Symbol" panose="05050102010706020507" pitchFamily="18" charset="2"/>
-              <a:buChar char="-"/>
-              <a:defRPr sz="2000">
-                <a:solidFill>
-                  <a:schemeClr val="tx1"/>
-                </a:solidFill>
-                <a:latin typeface="+mn-lt"/>
-                <a:ea typeface="+mn-ea"/>
-              </a:defRPr>
-            </a:lvl5pPr>
-            <a:lvl6pPr marL="1080000" indent="-288000" algn="l" rtl="0" fontAlgn="base">
-              <a:spcBef>
-                <a:spcPct val="20000"/>
-              </a:spcBef>
-              <a:spcAft>
-                <a:spcPts val="600"/>
-              </a:spcAft>
-              <a:buFont typeface="Symbol" panose="05050102010706020507" pitchFamily="18" charset="2"/>
-              <a:buChar char="-"/>
-              <a:defRPr sz="2000">
-                <a:solidFill>
-                  <a:schemeClr val="tx1"/>
-                </a:solidFill>
-                <a:latin typeface="+mn-lt"/>
-                <a:ea typeface="+mn-ea"/>
-              </a:defRPr>
-            </a:lvl6pPr>
-            <a:lvl7pPr marL="1080000" indent="-288000" algn="l" rtl="0" fontAlgn="base">
-              <a:spcBef>
-                <a:spcPct val="20000"/>
-              </a:spcBef>
-              <a:spcAft>
-                <a:spcPts val="600"/>
-              </a:spcAft>
-              <a:buFont typeface="Symbol" panose="05050102010706020507" pitchFamily="18" charset="2"/>
-              <a:buChar char="-"/>
-              <a:defRPr sz="2000">
-                <a:solidFill>
-                  <a:schemeClr val="tx1"/>
-                </a:solidFill>
-                <a:latin typeface="+mn-lt"/>
-                <a:ea typeface="+mn-ea"/>
-              </a:defRPr>
-            </a:lvl7pPr>
-            <a:lvl8pPr marL="1080000" indent="-288000" algn="l" rtl="0" fontAlgn="base">
-              <a:spcBef>
-                <a:spcPct val="20000"/>
-              </a:spcBef>
-              <a:spcAft>
-                <a:spcPts val="600"/>
-              </a:spcAft>
-              <a:buFont typeface="Symbol" panose="05050102010706020507" pitchFamily="18" charset="2"/>
-              <a:buChar char="-"/>
-              <a:defRPr sz="2000">
-                <a:solidFill>
-                  <a:schemeClr val="tx1"/>
-                </a:solidFill>
-                <a:latin typeface="+mn-lt"/>
-                <a:ea typeface="+mn-ea"/>
-              </a:defRPr>
-            </a:lvl8pPr>
-            <a:lvl9pPr marL="1080000" indent="-288000" algn="l" rtl="0" fontAlgn="base">
-              <a:spcBef>
-                <a:spcPct val="20000"/>
-              </a:spcBef>
-              <a:spcAft>
-                <a:spcPts val="600"/>
-              </a:spcAft>
-              <a:buFont typeface="Symbol" panose="05050102010706020507" pitchFamily="18" charset="2"/>
-              <a:buChar char="-"/>
-              <a:defRPr sz="2000">
-                <a:solidFill>
-                  <a:schemeClr val="tx1"/>
-                </a:solidFill>
-                <a:latin typeface="+mn-lt"/>
-                <a:ea typeface="+mn-ea"/>
-              </a:defRPr>
-            </a:lvl9pPr>
-          </a:lstStyle>
-          <a:p>
-            <a:pPr marL="0" indent="0" eaLnBrk="1" hangingPunct="1">
-              <a:buNone/>
-            </a:pPr>
-            <a:r>
-              <a:rPr lang="de-DE" sz="1000" kern="0" dirty="0"/>
-              <a:t>Abbildung: Typen von Zusammenfassungen nach </a:t>
-            </a:r>
-            <a:r>
-              <a:rPr lang="de-DE" sz="1000" kern="0" dirty="0" err="1"/>
-              <a:t>Gambhir</a:t>
-            </a:r>
-            <a:r>
-              <a:rPr lang="de-DE" sz="1000" kern="0" dirty="0"/>
-              <a:t>/ Gupta.</a:t>
-            </a:r>
-          </a:p>
-        </p:txBody>
-      </p:sp>
     </p:spTree>
     <p:extLst>
       <p:ext uri="{BB962C8B-B14F-4D97-AF65-F5344CB8AC3E}">
@@ -3978,7 +3735,19 @@
           <a:p>
             <a:r>
               <a:rPr lang="de-DE" sz="2400" dirty="0"/>
-              <a:t>Titel festlegen und Arbeit anmelden</a:t>
+              <a:t>Titel festlegen und Arbeit anmelden (</a:t>
+            </a:r>
+            <a:r>
+              <a:rPr lang="de-DE" sz="2400" dirty="0">
+                <a:solidFill>
+                  <a:srgbClr val="D20032"/>
+                </a:solidFill>
+              </a:rPr>
+              <a:t>!</a:t>
+            </a:r>
+            <a:r>
+              <a:rPr lang="de-DE" sz="2400" dirty="0"/>
+              <a:t>)</a:t>
             </a:r>
           </a:p>
         </p:txBody>

</xml_diff>